<commit_message>
Changes from our presentation
</commit_message>
<xml_diff>
--- a/Homeworks/Event Hawk.pptx
+++ b/Homeworks/Event Hawk.pptx
@@ -109,7 +109,16 @@
       </a:defRPr>
     </a:lvl9pPr>
   </p:defaultTextStyle>
+  <p:extLst>
+    <p:ext uri="{EFAFB233-063F-42B5-8137-9DF3F51BA10A}">
+      <p15:sldGuideLst xmlns:p15="http://schemas.microsoft.com/office/powerpoint/2012/main"/>
+    </p:ext>
+  </p:extLst>
 </p:presentation>
+</file>
+
+<file path=ppt/revisionInfo.xml><?xml version="1.0" encoding="utf-8"?>
+<p1510:revInfo xmlns:a="http://schemas.openxmlformats.org/drawingml/2006/main" xmlns:r="http://schemas.openxmlformats.org/officeDocument/2006/relationships" xmlns:p1510="http://schemas.microsoft.com/office/powerpoint/2015/10/main"/>
 </file>
 
 <file path=ppt/slideLayouts/slideLayout1.xml><?xml version="1.0" encoding="utf-8"?>
@@ -690,7 +699,7 @@
           </a:lstStyle>
           <a:p>
             <a:r>
-              <a:rPr lang="en-US" smtClean="0"/>
+              <a:rPr lang="en-US"/>
               <a:t>Click to edit Master title style</a:t>
             </a:r>
             <a:endParaRPr lang="en-US" dirty="0"/>
@@ -810,7 +819,7 @@
           </a:lstStyle>
           <a:p>
             <a:r>
-              <a:rPr lang="en-US" smtClean="0"/>
+              <a:rPr lang="en-US"/>
               <a:t>Click to edit Master subtitle style</a:t>
             </a:r>
             <a:endParaRPr lang="en-US" dirty="0"/>
@@ -834,7 +843,7 @@
           <a:p>
             <a:fld id="{730E3EE7-78B0-4F35-AE80-B69279271F16}" type="datetimeFigureOut">
               <a:rPr lang="en-US" smtClean="0"/>
-              <a:t>10/10/2017</a:t>
+              <a:t>10/17/2017</a:t>
             </a:fld>
             <a:endParaRPr lang="en-US"/>
           </a:p>
@@ -939,7 +948,7 @@
           </a:lstStyle>
           <a:p>
             <a:r>
-              <a:rPr lang="en-US" smtClean="0"/>
+              <a:rPr lang="en-US"/>
               <a:t>Click to edit Master title style</a:t>
             </a:r>
             <a:endParaRPr lang="en-US" dirty="0"/>
@@ -1062,7 +1071,7 @@
           <a:p>
             <a:pPr lvl="0"/>
             <a:r>
-              <a:rPr lang="en-US" smtClean="0"/>
+              <a:rPr lang="en-US"/>
               <a:t>Click to edit Master text styles</a:t>
             </a:r>
           </a:p>
@@ -1085,7 +1094,7 @@
           <a:p>
             <a:fld id="{730E3EE7-78B0-4F35-AE80-B69279271F16}" type="datetimeFigureOut">
               <a:rPr lang="en-US" smtClean="0"/>
-              <a:t>10/10/2017</a:t>
+              <a:t>10/17/2017</a:t>
             </a:fld>
             <a:endParaRPr lang="en-US"/>
           </a:p>
@@ -1190,7 +1199,7 @@
           </a:lstStyle>
           <a:p>
             <a:r>
-              <a:rPr lang="en-US" smtClean="0"/>
+              <a:rPr lang="en-US"/>
               <a:t>Click to edit Master title style</a:t>
             </a:r>
             <a:endParaRPr lang="en-US" dirty="0"/>
@@ -1254,7 +1263,7 @@
           <a:p>
             <a:pPr lvl="0"/>
             <a:r>
-              <a:rPr lang="en-US" smtClean="0"/>
+              <a:rPr lang="en-US"/>
               <a:t>Click to edit Master text styles</a:t>
             </a:r>
           </a:p>
@@ -1376,7 +1385,7 @@
           <a:p>
             <a:pPr lvl="0"/>
             <a:r>
-              <a:rPr lang="en-US" smtClean="0"/>
+              <a:rPr lang="en-US"/>
               <a:t>Click to edit Master text styles</a:t>
             </a:r>
           </a:p>
@@ -1399,7 +1408,7 @@
           <a:p>
             <a:fld id="{730E3EE7-78B0-4F35-AE80-B69279271F16}" type="datetimeFigureOut">
               <a:rPr lang="en-US" smtClean="0"/>
-              <a:t>10/10/2017</a:t>
+              <a:t>10/17/2017</a:t>
             </a:fld>
             <a:endParaRPr lang="en-US"/>
           </a:p>
@@ -1594,7 +1603,7 @@
           </a:lstStyle>
           <a:p>
             <a:r>
-              <a:rPr lang="en-US" smtClean="0"/>
+              <a:rPr lang="en-US"/>
               <a:t>Click to edit Master title style</a:t>
             </a:r>
             <a:endParaRPr lang="en-US" dirty="0"/>
@@ -1717,7 +1726,7 @@
           <a:p>
             <a:pPr lvl="0"/>
             <a:r>
-              <a:rPr lang="en-US" smtClean="0"/>
+              <a:rPr lang="en-US"/>
               <a:t>Click to edit Master text styles</a:t>
             </a:r>
           </a:p>
@@ -1740,7 +1749,7 @@
           <a:p>
             <a:fld id="{730E3EE7-78B0-4F35-AE80-B69279271F16}" type="datetimeFigureOut">
               <a:rPr lang="en-US" smtClean="0"/>
-              <a:t>10/10/2017</a:t>
+              <a:t>10/17/2017</a:t>
             </a:fld>
             <a:endParaRPr lang="en-US"/>
           </a:p>
@@ -1845,7 +1854,7 @@
           </a:lstStyle>
           <a:p>
             <a:r>
-              <a:rPr lang="en-US" smtClean="0"/>
+              <a:rPr lang="en-US"/>
               <a:t>Click to edit Master title style</a:t>
             </a:r>
             <a:endParaRPr lang="en-US" dirty="0"/>
@@ -1909,7 +1918,7 @@
           <a:p>
             <a:pPr lvl="0"/>
             <a:r>
-              <a:rPr lang="en-US" smtClean="0"/>
+              <a:rPr lang="en-US"/>
               <a:t>Click to edit Master text styles</a:t>
             </a:r>
           </a:p>
@@ -2031,7 +2040,7 @@
           <a:p>
             <a:pPr lvl="0"/>
             <a:r>
-              <a:rPr lang="en-US" smtClean="0"/>
+              <a:rPr lang="en-US"/>
               <a:t>Click to edit Master text styles</a:t>
             </a:r>
           </a:p>
@@ -2054,7 +2063,7 @@
           <a:p>
             <a:fld id="{730E3EE7-78B0-4F35-AE80-B69279271F16}" type="datetimeFigureOut">
               <a:rPr lang="en-US" smtClean="0"/>
-              <a:t>10/10/2017</a:t>
+              <a:t>10/17/2017</a:t>
             </a:fld>
             <a:endParaRPr lang="en-US"/>
           </a:p>
@@ -2241,7 +2250,7 @@
           </a:lstStyle>
           <a:p>
             <a:r>
-              <a:rPr lang="en-US" smtClean="0"/>
+              <a:rPr lang="en-US"/>
               <a:t>Click to edit Master title style</a:t>
             </a:r>
             <a:endParaRPr lang="en-US" dirty="0"/>
@@ -2302,7 +2311,7 @@
           <a:p>
             <a:pPr lvl="0"/>
             <a:r>
-              <a:rPr lang="en-US" smtClean="0"/>
+              <a:rPr lang="en-US"/>
               <a:t>Click to edit Master text styles</a:t>
             </a:r>
           </a:p>
@@ -2424,7 +2433,7 @@
           <a:p>
             <a:pPr lvl="0"/>
             <a:r>
-              <a:rPr lang="en-US" smtClean="0"/>
+              <a:rPr lang="en-US"/>
               <a:t>Click to edit Master text styles</a:t>
             </a:r>
           </a:p>
@@ -2447,7 +2456,7 @@
           <a:p>
             <a:fld id="{730E3EE7-78B0-4F35-AE80-B69279271F16}" type="datetimeFigureOut">
               <a:rPr lang="en-US" smtClean="0"/>
-              <a:t>10/10/2017</a:t>
+              <a:t>10/17/2017</a:t>
             </a:fld>
             <a:endParaRPr lang="en-US"/>
           </a:p>
@@ -2541,7 +2550,7 @@
           <a:lstStyle/>
           <a:p>
             <a:r>
-              <a:rPr lang="en-US" smtClean="0"/>
+              <a:rPr lang="en-US"/>
               <a:t>Click to edit Master title style</a:t>
             </a:r>
             <a:endParaRPr lang="en-US" dirty="0"/>
@@ -2565,35 +2574,35 @@
           <a:p>
             <a:pPr lvl="0"/>
             <a:r>
-              <a:rPr lang="en-US" smtClean="0"/>
+              <a:rPr lang="en-US"/>
               <a:t>Click to edit Master text styles</a:t>
             </a:r>
           </a:p>
           <a:p>
             <a:pPr lvl="1"/>
             <a:r>
-              <a:rPr lang="en-US" smtClean="0"/>
+              <a:rPr lang="en-US"/>
               <a:t>Second level</a:t>
             </a:r>
           </a:p>
           <a:p>
             <a:pPr lvl="2"/>
             <a:r>
-              <a:rPr lang="en-US" smtClean="0"/>
+              <a:rPr lang="en-US"/>
               <a:t>Third level</a:t>
             </a:r>
           </a:p>
           <a:p>
             <a:pPr lvl="3"/>
             <a:r>
-              <a:rPr lang="en-US" smtClean="0"/>
+              <a:rPr lang="en-US"/>
               <a:t>Fourth level</a:t>
             </a:r>
           </a:p>
           <a:p>
             <a:pPr lvl="4"/>
             <a:r>
-              <a:rPr lang="en-US" smtClean="0"/>
+              <a:rPr lang="en-US"/>
               <a:t>Fifth level</a:t>
             </a:r>
             <a:endParaRPr lang="en-US" dirty="0"/>
@@ -2617,7 +2626,7 @@
           <a:p>
             <a:fld id="{730E3EE7-78B0-4F35-AE80-B69279271F16}" type="datetimeFigureOut">
               <a:rPr lang="en-US" smtClean="0"/>
-              <a:t>10/10/2017</a:t>
+              <a:t>10/17/2017</a:t>
             </a:fld>
             <a:endParaRPr lang="en-US"/>
           </a:p>
@@ -2716,7 +2725,7 @@
           <a:lstStyle/>
           <a:p>
             <a:r>
-              <a:rPr lang="en-US" smtClean="0"/>
+              <a:rPr lang="en-US"/>
               <a:t>Click to edit Master title style</a:t>
             </a:r>
             <a:endParaRPr lang="en-US" dirty="0"/>
@@ -2745,35 +2754,35 @@
           <a:p>
             <a:pPr lvl="0"/>
             <a:r>
-              <a:rPr lang="en-US" smtClean="0"/>
+              <a:rPr lang="en-US"/>
               <a:t>Click to edit Master text styles</a:t>
             </a:r>
           </a:p>
           <a:p>
             <a:pPr lvl="1"/>
             <a:r>
-              <a:rPr lang="en-US" smtClean="0"/>
+              <a:rPr lang="en-US"/>
               <a:t>Second level</a:t>
             </a:r>
           </a:p>
           <a:p>
             <a:pPr lvl="2"/>
             <a:r>
-              <a:rPr lang="en-US" smtClean="0"/>
+              <a:rPr lang="en-US"/>
               <a:t>Third level</a:t>
             </a:r>
           </a:p>
           <a:p>
             <a:pPr lvl="3"/>
             <a:r>
-              <a:rPr lang="en-US" smtClean="0"/>
+              <a:rPr lang="en-US"/>
               <a:t>Fourth level</a:t>
             </a:r>
           </a:p>
           <a:p>
             <a:pPr lvl="4"/>
             <a:r>
-              <a:rPr lang="en-US" smtClean="0"/>
+              <a:rPr lang="en-US"/>
               <a:t>Fifth level</a:t>
             </a:r>
             <a:endParaRPr lang="en-US" dirty="0"/>
@@ -2797,7 +2806,7 @@
           <a:p>
             <a:fld id="{730E3EE7-78B0-4F35-AE80-B69279271F16}" type="datetimeFigureOut">
               <a:rPr lang="en-US" smtClean="0"/>
-              <a:t>10/10/2017</a:t>
+              <a:t>10/17/2017</a:t>
             </a:fld>
             <a:endParaRPr lang="en-US"/>
           </a:p>
@@ -2897,7 +2906,7 @@
           </a:lstStyle>
           <a:p>
             <a:r>
-              <a:rPr lang="en-US" smtClean="0"/>
+              <a:rPr lang="en-US"/>
               <a:t>Click to edit Master title style</a:t>
             </a:r>
             <a:endParaRPr lang="en-US" dirty="0"/>
@@ -2921,35 +2930,35 @@
           <a:p>
             <a:pPr lvl="0"/>
             <a:r>
-              <a:rPr lang="en-US" smtClean="0"/>
+              <a:rPr lang="en-US"/>
               <a:t>Click to edit Master text styles</a:t>
             </a:r>
           </a:p>
           <a:p>
             <a:pPr lvl="1"/>
             <a:r>
-              <a:rPr lang="en-US" smtClean="0"/>
+              <a:rPr lang="en-US"/>
               <a:t>Second level</a:t>
             </a:r>
           </a:p>
           <a:p>
             <a:pPr lvl="2"/>
             <a:r>
-              <a:rPr lang="en-US" smtClean="0"/>
+              <a:rPr lang="en-US"/>
               <a:t>Third level</a:t>
             </a:r>
           </a:p>
           <a:p>
             <a:pPr lvl="3"/>
             <a:r>
-              <a:rPr lang="en-US" smtClean="0"/>
+              <a:rPr lang="en-US"/>
               <a:t>Fourth level</a:t>
             </a:r>
           </a:p>
           <a:p>
             <a:pPr lvl="4"/>
             <a:r>
-              <a:rPr lang="en-US" smtClean="0"/>
+              <a:rPr lang="en-US"/>
               <a:t>Fifth level</a:t>
             </a:r>
             <a:endParaRPr lang="en-US" dirty="0"/>
@@ -2973,7 +2982,7 @@
           <a:p>
             <a:fld id="{730E3EE7-78B0-4F35-AE80-B69279271F16}" type="datetimeFigureOut">
               <a:rPr lang="en-US" smtClean="0"/>
-              <a:t>10/10/2017</a:t>
+              <a:t>10/17/2017</a:t>
             </a:fld>
             <a:endParaRPr lang="en-US"/>
           </a:p>
@@ -3076,7 +3085,7 @@
           </a:lstStyle>
           <a:p>
             <a:r>
-              <a:rPr lang="en-US" smtClean="0"/>
+              <a:rPr lang="en-US"/>
               <a:t>Click to edit Master title style</a:t>
             </a:r>
             <a:endParaRPr lang="en-US" dirty="0"/>
@@ -3197,7 +3206,7 @@
           <a:p>
             <a:pPr lvl="0"/>
             <a:r>
-              <a:rPr lang="en-US" smtClean="0"/>
+              <a:rPr lang="en-US"/>
               <a:t>Click to edit Master text styles</a:t>
             </a:r>
           </a:p>
@@ -3220,7 +3229,7 @@
           <a:p>
             <a:fld id="{730E3EE7-78B0-4F35-AE80-B69279271F16}" type="datetimeFigureOut">
               <a:rPr lang="en-US" smtClean="0"/>
-              <a:t>10/10/2017</a:t>
+              <a:t>10/17/2017</a:t>
             </a:fld>
             <a:endParaRPr lang="en-US"/>
           </a:p>
@@ -3314,7 +3323,7 @@
           <a:lstStyle/>
           <a:p>
             <a:r>
-              <a:rPr lang="en-US" smtClean="0"/>
+              <a:rPr lang="en-US"/>
               <a:t>Click to edit Master title style</a:t>
             </a:r>
             <a:endParaRPr lang="en-US" dirty="0"/>
@@ -3343,35 +3352,35 @@
           <a:p>
             <a:pPr lvl="0"/>
             <a:r>
-              <a:rPr lang="en-US" smtClean="0"/>
+              <a:rPr lang="en-US"/>
               <a:t>Click to edit Master text styles</a:t>
             </a:r>
           </a:p>
           <a:p>
             <a:pPr lvl="1"/>
             <a:r>
-              <a:rPr lang="en-US" smtClean="0"/>
+              <a:rPr lang="en-US"/>
               <a:t>Second level</a:t>
             </a:r>
           </a:p>
           <a:p>
             <a:pPr lvl="2"/>
             <a:r>
-              <a:rPr lang="en-US" smtClean="0"/>
+              <a:rPr lang="en-US"/>
               <a:t>Third level</a:t>
             </a:r>
           </a:p>
           <a:p>
             <a:pPr lvl="3"/>
             <a:r>
-              <a:rPr lang="en-US" smtClean="0"/>
+              <a:rPr lang="en-US"/>
               <a:t>Fourth level</a:t>
             </a:r>
           </a:p>
           <a:p>
             <a:pPr lvl="4"/>
             <a:r>
-              <a:rPr lang="en-US" smtClean="0"/>
+              <a:rPr lang="en-US"/>
               <a:t>Fifth level</a:t>
             </a:r>
             <a:endParaRPr lang="en-US" dirty="0"/>
@@ -3400,35 +3409,35 @@
           <a:p>
             <a:pPr lvl="0"/>
             <a:r>
-              <a:rPr lang="en-US" smtClean="0"/>
+              <a:rPr lang="en-US"/>
               <a:t>Click to edit Master text styles</a:t>
             </a:r>
           </a:p>
           <a:p>
             <a:pPr lvl="1"/>
             <a:r>
-              <a:rPr lang="en-US" smtClean="0"/>
+              <a:rPr lang="en-US"/>
               <a:t>Second level</a:t>
             </a:r>
           </a:p>
           <a:p>
             <a:pPr lvl="2"/>
             <a:r>
-              <a:rPr lang="en-US" smtClean="0"/>
+              <a:rPr lang="en-US"/>
               <a:t>Third level</a:t>
             </a:r>
           </a:p>
           <a:p>
             <a:pPr lvl="3"/>
             <a:r>
-              <a:rPr lang="en-US" smtClean="0"/>
+              <a:rPr lang="en-US"/>
               <a:t>Fourth level</a:t>
             </a:r>
           </a:p>
           <a:p>
             <a:pPr lvl="4"/>
             <a:r>
-              <a:rPr lang="en-US" smtClean="0"/>
+              <a:rPr lang="en-US"/>
               <a:t>Fifth level</a:t>
             </a:r>
             <a:endParaRPr lang="en-US" dirty="0"/>
@@ -3452,7 +3461,7 @@
           <a:p>
             <a:fld id="{730E3EE7-78B0-4F35-AE80-B69279271F16}" type="datetimeFigureOut">
               <a:rPr lang="en-US" smtClean="0"/>
-              <a:t>10/10/2017</a:t>
+              <a:t>10/17/2017</a:t>
             </a:fld>
             <a:endParaRPr lang="en-US"/>
           </a:p>
@@ -3550,7 +3559,7 @@
           </a:lstStyle>
           <a:p>
             <a:r>
-              <a:rPr lang="en-US" smtClean="0"/>
+              <a:rPr lang="en-US"/>
               <a:t>Click to edit Master title style</a:t>
             </a:r>
             <a:endParaRPr lang="en-US" dirty="0"/>
@@ -3618,7 +3627,7 @@
           <a:p>
             <a:pPr lvl="0"/>
             <a:r>
-              <a:rPr lang="en-US" smtClean="0"/>
+              <a:rPr lang="en-US"/>
               <a:t>Click to edit Master text styles</a:t>
             </a:r>
           </a:p>
@@ -3648,35 +3657,35 @@
           <a:p>
             <a:pPr lvl="0"/>
             <a:r>
-              <a:rPr lang="en-US" smtClean="0"/>
+              <a:rPr lang="en-US"/>
               <a:t>Click to edit Master text styles</a:t>
             </a:r>
           </a:p>
           <a:p>
             <a:pPr lvl="1"/>
             <a:r>
-              <a:rPr lang="en-US" smtClean="0"/>
+              <a:rPr lang="en-US"/>
               <a:t>Second level</a:t>
             </a:r>
           </a:p>
           <a:p>
             <a:pPr lvl="2"/>
             <a:r>
-              <a:rPr lang="en-US" smtClean="0"/>
+              <a:rPr lang="en-US"/>
               <a:t>Third level</a:t>
             </a:r>
           </a:p>
           <a:p>
             <a:pPr lvl="3"/>
             <a:r>
-              <a:rPr lang="en-US" smtClean="0"/>
+              <a:rPr lang="en-US"/>
               <a:t>Fourth level</a:t>
             </a:r>
           </a:p>
           <a:p>
             <a:pPr lvl="4"/>
             <a:r>
-              <a:rPr lang="en-US" smtClean="0"/>
+              <a:rPr lang="en-US"/>
               <a:t>Fifth level</a:t>
             </a:r>
             <a:endParaRPr lang="en-US" dirty="0"/>
@@ -3744,7 +3753,7 @@
           <a:p>
             <a:pPr lvl="0"/>
             <a:r>
-              <a:rPr lang="en-US" smtClean="0"/>
+              <a:rPr lang="en-US"/>
               <a:t>Click to edit Master text styles</a:t>
             </a:r>
           </a:p>
@@ -3774,35 +3783,35 @@
           <a:p>
             <a:pPr lvl="0"/>
             <a:r>
-              <a:rPr lang="en-US" smtClean="0"/>
+              <a:rPr lang="en-US"/>
               <a:t>Click to edit Master text styles</a:t>
             </a:r>
           </a:p>
           <a:p>
             <a:pPr lvl="1"/>
             <a:r>
-              <a:rPr lang="en-US" smtClean="0"/>
+              <a:rPr lang="en-US"/>
               <a:t>Second level</a:t>
             </a:r>
           </a:p>
           <a:p>
             <a:pPr lvl="2"/>
             <a:r>
-              <a:rPr lang="en-US" smtClean="0"/>
+              <a:rPr lang="en-US"/>
               <a:t>Third level</a:t>
             </a:r>
           </a:p>
           <a:p>
             <a:pPr lvl="3"/>
             <a:r>
-              <a:rPr lang="en-US" smtClean="0"/>
+              <a:rPr lang="en-US"/>
               <a:t>Fourth level</a:t>
             </a:r>
           </a:p>
           <a:p>
             <a:pPr lvl="4"/>
             <a:r>
-              <a:rPr lang="en-US" smtClean="0"/>
+              <a:rPr lang="en-US"/>
               <a:t>Fifth level</a:t>
             </a:r>
             <a:endParaRPr lang="en-US" dirty="0"/>
@@ -3826,7 +3835,7 @@
           <a:p>
             <a:fld id="{730E3EE7-78B0-4F35-AE80-B69279271F16}" type="datetimeFigureOut">
               <a:rPr lang="en-US" smtClean="0"/>
-              <a:t>10/10/2017</a:t>
+              <a:t>10/17/2017</a:t>
             </a:fld>
             <a:endParaRPr lang="en-US"/>
           </a:p>
@@ -3925,7 +3934,7 @@
           <a:lstStyle/>
           <a:p>
             <a:r>
-              <a:rPr lang="en-US" smtClean="0"/>
+              <a:rPr lang="en-US"/>
               <a:t>Click to edit Master title style</a:t>
             </a:r>
             <a:endParaRPr lang="en-US" dirty="0"/>
@@ -3949,7 +3958,7 @@
           <a:p>
             <a:fld id="{730E3EE7-78B0-4F35-AE80-B69279271F16}" type="datetimeFigureOut">
               <a:rPr lang="en-US" smtClean="0"/>
-              <a:t>10/10/2017</a:t>
+              <a:t>10/17/2017</a:t>
             </a:fld>
             <a:endParaRPr lang="en-US"/>
           </a:p>
@@ -4044,7 +4053,7 @@
           <a:p>
             <a:fld id="{730E3EE7-78B0-4F35-AE80-B69279271F16}" type="datetimeFigureOut">
               <a:rPr lang="en-US" smtClean="0"/>
-              <a:t>10/10/2017</a:t>
+              <a:t>10/17/2017</a:t>
             </a:fld>
             <a:endParaRPr lang="en-US"/>
           </a:p>
@@ -4149,7 +4158,7 @@
           </a:lstStyle>
           <a:p>
             <a:r>
-              <a:rPr lang="en-US" smtClean="0"/>
+              <a:rPr lang="en-US"/>
               <a:t>Click to edit Master title style</a:t>
             </a:r>
             <a:endParaRPr lang="en-US" dirty="0"/>
@@ -4180,35 +4189,35 @@
           <a:p>
             <a:pPr lvl="0"/>
             <a:r>
-              <a:rPr lang="en-US" smtClean="0"/>
+              <a:rPr lang="en-US"/>
               <a:t>Click to edit Master text styles</a:t>
             </a:r>
           </a:p>
           <a:p>
             <a:pPr lvl="1"/>
             <a:r>
-              <a:rPr lang="en-US" smtClean="0"/>
+              <a:rPr lang="en-US"/>
               <a:t>Second level</a:t>
             </a:r>
           </a:p>
           <a:p>
             <a:pPr lvl="2"/>
             <a:r>
-              <a:rPr lang="en-US" smtClean="0"/>
+              <a:rPr lang="en-US"/>
               <a:t>Third level</a:t>
             </a:r>
           </a:p>
           <a:p>
             <a:pPr lvl="3"/>
             <a:r>
-              <a:rPr lang="en-US" smtClean="0"/>
+              <a:rPr lang="en-US"/>
               <a:t>Fourth level</a:t>
             </a:r>
           </a:p>
           <a:p>
             <a:pPr lvl="4"/>
             <a:r>
-              <a:rPr lang="en-US" smtClean="0"/>
+              <a:rPr lang="en-US"/>
               <a:t>Fifth level</a:t>
             </a:r>
             <a:endParaRPr lang="en-US" dirty="0"/>
@@ -4276,7 +4285,7 @@
           <a:p>
             <a:pPr lvl="0"/>
             <a:r>
-              <a:rPr lang="en-US" smtClean="0"/>
+              <a:rPr lang="en-US"/>
               <a:t>Click to edit Master text styles</a:t>
             </a:r>
           </a:p>
@@ -4299,7 +4308,7 @@
           <a:p>
             <a:fld id="{730E3EE7-78B0-4F35-AE80-B69279271F16}" type="datetimeFigureOut">
               <a:rPr lang="en-US" smtClean="0"/>
-              <a:t>10/10/2017</a:t>
+              <a:t>10/17/2017</a:t>
             </a:fld>
             <a:endParaRPr lang="en-US"/>
           </a:p>
@@ -4404,7 +4413,7 @@
           </a:lstStyle>
           <a:p>
             <a:r>
-              <a:rPr lang="en-US" smtClean="0"/>
+              <a:rPr lang="en-US"/>
               <a:t>Click to edit Master title style</a:t>
             </a:r>
             <a:endParaRPr lang="en-US" dirty="0"/>
@@ -4471,7 +4480,7 @@
           </a:lstStyle>
           <a:p>
             <a:r>
-              <a:rPr lang="en-US" smtClean="0"/>
+              <a:rPr lang="en-US"/>
               <a:t>Click icon to add picture</a:t>
             </a:r>
             <a:endParaRPr lang="en-US" dirty="0"/>
@@ -4539,7 +4548,7 @@
           <a:p>
             <a:pPr lvl="0"/>
             <a:r>
-              <a:rPr lang="en-US" smtClean="0"/>
+              <a:rPr lang="en-US"/>
               <a:t>Click to edit Master text styles</a:t>
             </a:r>
           </a:p>
@@ -4562,7 +4571,7 @@
           <a:p>
             <a:fld id="{730E3EE7-78B0-4F35-AE80-B69279271F16}" type="datetimeFigureOut">
               <a:rPr lang="en-US" smtClean="0"/>
-              <a:t>10/10/2017</a:t>
+              <a:t>10/17/2017</a:t>
             </a:fld>
             <a:endParaRPr lang="en-US"/>
           </a:p>
@@ -5201,7 +5210,7 @@
           <a:lstStyle/>
           <a:p>
             <a:r>
-              <a:rPr lang="en-US" smtClean="0"/>
+              <a:rPr lang="en-US"/>
               <a:t>Click to edit Master title style</a:t>
             </a:r>
             <a:endParaRPr lang="en-US" dirty="0"/>
@@ -5235,35 +5244,35 @@
           <a:p>
             <a:pPr lvl="0"/>
             <a:r>
-              <a:rPr lang="en-US" smtClean="0"/>
+              <a:rPr lang="en-US"/>
               <a:t>Click to edit Master text styles</a:t>
             </a:r>
           </a:p>
           <a:p>
             <a:pPr lvl="1"/>
             <a:r>
-              <a:rPr lang="en-US" smtClean="0"/>
+              <a:rPr lang="en-US"/>
               <a:t>Second level</a:t>
             </a:r>
           </a:p>
           <a:p>
             <a:pPr lvl="2"/>
             <a:r>
-              <a:rPr lang="en-US" smtClean="0"/>
+              <a:rPr lang="en-US"/>
               <a:t>Third level</a:t>
             </a:r>
           </a:p>
           <a:p>
             <a:pPr lvl="3"/>
             <a:r>
-              <a:rPr lang="en-US" smtClean="0"/>
+              <a:rPr lang="en-US"/>
               <a:t>Fourth level</a:t>
             </a:r>
           </a:p>
           <a:p>
             <a:pPr lvl="4"/>
             <a:r>
-              <a:rPr lang="en-US" smtClean="0"/>
+              <a:rPr lang="en-US"/>
               <a:t>Fifth level</a:t>
             </a:r>
             <a:endParaRPr lang="en-US" dirty="0"/>
@@ -5305,7 +5314,7 @@
           <a:p>
             <a:fld id="{730E3EE7-78B0-4F35-AE80-B69279271F16}" type="datetimeFigureOut">
               <a:rPr lang="en-US" smtClean="0"/>
-              <a:t>10/10/2017</a:t>
+              <a:t>10/17/2017</a:t>
             </a:fld>
             <a:endParaRPr lang="en-US"/>
           </a:p>
@@ -5845,10 +5854,9 @@
           <a:lstStyle/>
           <a:p>
             <a:r>
-              <a:rPr lang="en-US" dirty="0" smtClean="0"/>
+              <a:rPr lang="en-US" dirty="0"/>
               <a:t>Event Hawk</a:t>
             </a:r>
-            <a:endParaRPr lang="en-US" dirty="0"/>
           </a:p>
         </p:txBody>
       </p:sp>
@@ -5868,10 +5876,9 @@
           <a:lstStyle/>
           <a:p>
             <a:r>
-              <a:rPr lang="en-US" dirty="0" smtClean="0"/>
+              <a:rPr lang="en-US" dirty="0"/>
               <a:t>Find pick up events at UML</a:t>
             </a:r>
-            <a:endParaRPr lang="en-US" dirty="0"/>
           </a:p>
         </p:txBody>
       </p:sp>
@@ -5921,72 +5928,71 @@
           <a:lstStyle/>
           <a:p>
             <a:r>
-              <a:rPr lang="en-US" dirty="0" smtClean="0"/>
+              <a:rPr lang="en-US" dirty="0"/>
               <a:t>What is Event Hawk?</a:t>
             </a:r>
+          </a:p>
+        </p:txBody>
+      </p:sp>
+      <p:sp>
+        <p:nvSpPr>
+          <p:cNvPr id="3" name="Content Placeholder 2"/>
+          <p:cNvSpPr>
+            <a:spLocks noGrp="1"/>
+          </p:cNvSpPr>
+          <p:nvPr>
+            <p:ph idx="1"/>
+          </p:nvPr>
+        </p:nvSpPr>
+        <p:spPr/>
+        <p:txBody>
+          <a:bodyPr/>
+          <a:lstStyle/>
+          <a:p>
+            <a:r>
+              <a:rPr lang="en-US" dirty="0"/>
+              <a:t>Organize events that slip through Facebook and UML Calendar</a:t>
+            </a:r>
+          </a:p>
+          <a:p>
+            <a:r>
+              <a:rPr lang="en-US" dirty="0"/>
+              <a:t>Web app</a:t>
+            </a:r>
+          </a:p>
+          <a:p>
+            <a:r>
+              <a:rPr lang="en-US" dirty="0"/>
+              <a:t>UML students only</a:t>
+            </a:r>
+          </a:p>
+          <a:p>
+            <a:r>
+              <a:rPr lang="en-US" dirty="0"/>
+              <a:t>Create and find events near you</a:t>
+            </a:r>
+          </a:p>
+          <a:p>
+            <a:pPr lvl="1"/>
+            <a:r>
+              <a:rPr lang="en-US" dirty="0"/>
+              <a:t>Filters and sorting by popularity, sport, etc.</a:t>
+            </a:r>
+          </a:p>
+          <a:p>
+            <a:r>
+              <a:rPr lang="en-US" dirty="0"/>
+              <a:t>Rank events by popularity and interest</a:t>
+            </a:r>
+          </a:p>
+          <a:p>
+            <a:r>
+              <a:rPr lang="en-US" dirty="0"/>
+              <a:t>Review and rank event hosts</a:t>
+            </a:r>
+          </a:p>
+          <a:p>
             <a:endParaRPr lang="en-US" dirty="0"/>
-          </a:p>
-        </p:txBody>
-      </p:sp>
-      <p:sp>
-        <p:nvSpPr>
-          <p:cNvPr id="3" name="Content Placeholder 2"/>
-          <p:cNvSpPr>
-            <a:spLocks noGrp="1"/>
-          </p:cNvSpPr>
-          <p:nvPr>
-            <p:ph idx="1"/>
-          </p:nvPr>
-        </p:nvSpPr>
-        <p:spPr/>
-        <p:txBody>
-          <a:bodyPr/>
-          <a:lstStyle/>
-          <a:p>
-            <a:r>
-              <a:rPr lang="en-US" dirty="0" smtClean="0"/>
-              <a:t>Organize events that slip through Facebook and UML Calendar</a:t>
-            </a:r>
-          </a:p>
-          <a:p>
-            <a:r>
-              <a:rPr lang="en-US" dirty="0" smtClean="0"/>
-              <a:t>Web app</a:t>
-            </a:r>
-          </a:p>
-          <a:p>
-            <a:r>
-              <a:rPr lang="en-US" dirty="0" smtClean="0"/>
-              <a:t>UML students only</a:t>
-            </a:r>
-          </a:p>
-          <a:p>
-            <a:r>
-              <a:rPr lang="en-US" dirty="0" smtClean="0"/>
-              <a:t>Create and find events near you</a:t>
-            </a:r>
-          </a:p>
-          <a:p>
-            <a:pPr lvl="1"/>
-            <a:r>
-              <a:rPr lang="en-US" dirty="0" smtClean="0"/>
-              <a:t>Filters and sorting by popularity, sport, etc.</a:t>
-            </a:r>
-          </a:p>
-          <a:p>
-            <a:r>
-              <a:rPr lang="en-US" dirty="0" smtClean="0"/>
-              <a:t>Rank events by popularity and interest</a:t>
-            </a:r>
-          </a:p>
-          <a:p>
-            <a:r>
-              <a:rPr lang="en-US" dirty="0" smtClean="0"/>
-              <a:t>Review and rank event hosts</a:t>
-            </a:r>
-          </a:p>
-          <a:p>
-            <a:endParaRPr lang="en-US" dirty="0" smtClean="0"/>
           </a:p>
           <a:p>
             <a:endParaRPr lang="en-US" dirty="0"/>
@@ -6039,10 +6045,9 @@
           <a:lstStyle/>
           <a:p>
             <a:r>
-              <a:rPr lang="en-US" dirty="0" smtClean="0"/>
+              <a:rPr lang="en-US" dirty="0"/>
               <a:t>Current status</a:t>
             </a:r>
-            <a:endParaRPr lang="en-US" dirty="0"/>
           </a:p>
         </p:txBody>
       </p:sp>
@@ -6062,62 +6067,62 @@
           <a:lstStyle/>
           <a:p>
             <a:r>
-              <a:rPr lang="en-US" dirty="0" smtClean="0"/>
+              <a:rPr lang="en-US" dirty="0"/>
               <a:t>UI</a:t>
             </a:r>
           </a:p>
           <a:p>
             <a:pPr lvl="1"/>
             <a:r>
-              <a:rPr lang="en-US" dirty="0" smtClean="0"/>
+              <a:rPr lang="en-US" dirty="0"/>
               <a:t>Basic pages</a:t>
             </a:r>
           </a:p>
           <a:p>
             <a:pPr lvl="1"/>
             <a:r>
-              <a:rPr lang="en-US" dirty="0" smtClean="0"/>
+              <a:rPr lang="en-US" dirty="0"/>
               <a:t>Limited filtering</a:t>
             </a:r>
           </a:p>
           <a:p>
             <a:pPr lvl="1"/>
             <a:r>
-              <a:rPr lang="en-US" dirty="0" smtClean="0"/>
-              <a:t>No backend integration</a:t>
+              <a:rPr lang="en-US" dirty="0"/>
+              <a:t>Initial backend integration</a:t>
             </a:r>
           </a:p>
           <a:p>
             <a:pPr lvl="1"/>
             <a:r>
-              <a:rPr lang="en-US" dirty="0" smtClean="0"/>
+              <a:rPr lang="en-US" dirty="0"/>
               <a:t>Responsive (mobile friendly)</a:t>
             </a:r>
           </a:p>
           <a:p>
             <a:r>
-              <a:rPr lang="en-US" dirty="0" smtClean="0"/>
+              <a:rPr lang="en-US" dirty="0"/>
               <a:t>API</a:t>
             </a:r>
           </a:p>
           <a:p>
             <a:pPr lvl="1"/>
             <a:r>
-              <a:rPr lang="en-US" dirty="0" smtClean="0"/>
+              <a:rPr lang="en-US" dirty="0"/>
               <a:t>Basic routes are defined</a:t>
             </a:r>
           </a:p>
           <a:p>
             <a:pPr lvl="1"/>
             <a:r>
-              <a:rPr lang="en-US" dirty="0" smtClean="0"/>
+              <a:rPr lang="en-US" dirty="0"/>
               <a:t>Responds to requests (GET, POST, PUT)</a:t>
             </a:r>
           </a:p>
           <a:p>
             <a:pPr lvl="1"/>
             <a:r>
-              <a:rPr lang="en-US" dirty="0" smtClean="0"/>
+              <a:rPr lang="en-US" dirty="0"/>
               <a:t>Models in place to accept/serve JSON</a:t>
             </a:r>
           </a:p>
@@ -6173,10 +6178,9 @@
           <a:lstStyle/>
           <a:p>
             <a:r>
-              <a:rPr lang="en-US" dirty="0" smtClean="0"/>
+              <a:rPr lang="en-US" dirty="0"/>
               <a:t>Goals</a:t>
             </a:r>
-            <a:endParaRPr lang="en-US" dirty="0"/>
           </a:p>
         </p:txBody>
       </p:sp>
@@ -6196,69 +6200,69 @@
           <a:lstStyle/>
           <a:p>
             <a:r>
-              <a:rPr lang="en-US" dirty="0" smtClean="0"/>
+              <a:rPr lang="en-US" dirty="0"/>
               <a:t>UI</a:t>
             </a:r>
           </a:p>
           <a:p>
             <a:pPr lvl="1"/>
             <a:r>
-              <a:rPr lang="en-US" dirty="0" smtClean="0"/>
+              <a:rPr lang="en-US" dirty="0"/>
               <a:t>Finish adding pages</a:t>
             </a:r>
           </a:p>
           <a:p>
             <a:pPr lvl="1"/>
             <a:r>
-              <a:rPr lang="en-US" dirty="0" smtClean="0"/>
+              <a:rPr lang="en-US" dirty="0"/>
               <a:t>Support filters</a:t>
             </a:r>
           </a:p>
           <a:p>
             <a:pPr lvl="1"/>
             <a:r>
-              <a:rPr lang="en-US" dirty="0" smtClean="0"/>
-              <a:t>Integrate with backend</a:t>
+              <a:rPr lang="en-US" dirty="0"/>
+              <a:t>Complete integration with backend</a:t>
             </a:r>
           </a:p>
           <a:p>
             <a:pPr lvl="1"/>
             <a:r>
-              <a:rPr lang="en-US" dirty="0" smtClean="0"/>
+              <a:rPr lang="en-US" dirty="0"/>
               <a:t>Stay responsive for mobile users</a:t>
             </a:r>
           </a:p>
           <a:p>
             <a:pPr lvl="1"/>
             <a:r>
-              <a:rPr lang="en-US" dirty="0" smtClean="0"/>
+              <a:rPr lang="en-US" dirty="0"/>
               <a:t>Support user authentication</a:t>
             </a:r>
           </a:p>
           <a:p>
             <a:r>
-              <a:rPr lang="en-US" dirty="0" smtClean="0"/>
+              <a:rPr lang="en-US" dirty="0"/>
               <a:t>API</a:t>
             </a:r>
           </a:p>
           <a:p>
             <a:pPr lvl="1"/>
             <a:r>
-              <a:rPr lang="en-US" dirty="0" smtClean="0"/>
+              <a:rPr lang="en-US" dirty="0"/>
               <a:t>Complete routes</a:t>
             </a:r>
           </a:p>
           <a:p>
             <a:pPr lvl="1"/>
             <a:r>
-              <a:rPr lang="en-US" dirty="0" smtClean="0"/>
+              <a:rPr lang="en-US" dirty="0"/>
               <a:t>HTTP request validation</a:t>
             </a:r>
           </a:p>
           <a:p>
             <a:pPr lvl="1"/>
             <a:r>
-              <a:rPr lang="en-US" dirty="0" smtClean="0"/>
+              <a:rPr lang="en-US" dirty="0"/>
               <a:t>Client authentication</a:t>
             </a:r>
           </a:p>
@@ -6314,10 +6318,9 @@
           <a:lstStyle/>
           <a:p>
             <a:r>
-              <a:rPr lang="en-US" dirty="0" smtClean="0"/>
+              <a:rPr lang="en-US" dirty="0"/>
               <a:t>Technologies</a:t>
             </a:r>
-            <a:endParaRPr lang="en-US" dirty="0"/>
           </a:p>
         </p:txBody>
       </p:sp>
@@ -6339,61 +6342,61 @@
           <a:lstStyle/>
           <a:p>
             <a:r>
-              <a:rPr lang="en-US" dirty="0" smtClean="0"/>
+              <a:rPr lang="en-US" dirty="0"/>
               <a:t>UI</a:t>
             </a:r>
           </a:p>
           <a:p>
             <a:pPr lvl="1"/>
             <a:r>
-              <a:rPr lang="en-US" dirty="0" smtClean="0"/>
+              <a:rPr lang="en-US" dirty="0"/>
               <a:t>React</a:t>
             </a:r>
           </a:p>
           <a:p>
             <a:pPr lvl="1"/>
             <a:r>
-              <a:rPr lang="en-US" dirty="0" smtClean="0"/>
+              <a:rPr lang="en-US" dirty="0"/>
               <a:t>React-Bootstrap</a:t>
             </a:r>
           </a:p>
           <a:p>
             <a:pPr lvl="1"/>
             <a:r>
-              <a:rPr lang="en-US" dirty="0" smtClean="0"/>
+              <a:rPr lang="en-US" dirty="0"/>
               <a:t>React router</a:t>
             </a:r>
           </a:p>
           <a:p>
             <a:pPr lvl="1"/>
             <a:r>
-              <a:rPr lang="en-US" dirty="0" smtClean="0"/>
+              <a:rPr lang="en-US" dirty="0"/>
               <a:t>Typescript</a:t>
             </a:r>
           </a:p>
           <a:p>
             <a:pPr lvl="1"/>
             <a:r>
-              <a:rPr lang="en-US" dirty="0" err="1" smtClean="0"/>
+              <a:rPr lang="en-US" dirty="0" err="1"/>
               <a:t>Jquery</a:t>
             </a:r>
-            <a:endParaRPr lang="en-US" dirty="0" smtClean="0"/>
+            <a:endParaRPr lang="en-US" dirty="0"/>
           </a:p>
           <a:p>
             <a:pPr lvl="1"/>
             <a:r>
-              <a:rPr lang="en-US" dirty="0" err="1" smtClean="0"/>
+              <a:rPr lang="en-US" dirty="0" err="1"/>
               <a:t>NodeJS</a:t>
             </a:r>
-            <a:endParaRPr lang="en-US" dirty="0" smtClean="0"/>
+            <a:endParaRPr lang="en-US" dirty="0"/>
           </a:p>
           <a:p>
             <a:pPr lvl="1"/>
             <a:r>
-              <a:rPr lang="en-US" dirty="0" err="1" smtClean="0"/>
+              <a:rPr lang="en-US" dirty="0" err="1"/>
               <a:t>Webpack</a:t>
             </a:r>
-            <a:endParaRPr lang="en-US" dirty="0" smtClean="0"/>
+            <a:endParaRPr lang="en-US" dirty="0"/>
           </a:p>
         </p:txBody>
       </p:sp>
@@ -6424,7 +6427,7 @@
               <a:buChar char="•"/>
             </a:pPr>
             <a:r>
-              <a:rPr lang="en-US" dirty="0" smtClean="0"/>
+              <a:rPr lang="en-US" dirty="0"/>
               <a:t>API</a:t>
             </a:r>
           </a:p>
@@ -6434,7 +6437,7 @@
               <a:buChar char="•"/>
             </a:pPr>
             <a:r>
-              <a:rPr lang="en-US" dirty="0" smtClean="0"/>
+              <a:rPr lang="en-US" dirty="0"/>
               <a:t>Ruby</a:t>
             </a:r>
           </a:p>
@@ -6444,7 +6447,7 @@
               <a:buChar char="•"/>
             </a:pPr>
             <a:r>
-              <a:rPr lang="en-US" dirty="0" smtClean="0"/>
+              <a:rPr lang="en-US" dirty="0"/>
               <a:t>Rails 5</a:t>
             </a:r>
           </a:p>
@@ -6454,11 +6457,11 @@
               <a:buChar char="•"/>
             </a:pPr>
             <a:r>
-              <a:rPr lang="en-US" dirty="0" err="1" smtClean="0"/>
+              <a:rPr lang="en-US" dirty="0" err="1"/>
               <a:t>Mongoid</a:t>
             </a:r>
             <a:r>
-              <a:rPr lang="en-US" dirty="0" smtClean="0"/>
+              <a:rPr lang="en-US" dirty="0"/>
               <a:t> 5 (Mongo DB gem)</a:t>
             </a:r>
           </a:p>
@@ -6468,7 +6471,7 @@
               <a:buChar char="•"/>
             </a:pPr>
             <a:r>
-              <a:rPr lang="en-US" dirty="0" smtClean="0"/>
+              <a:rPr lang="en-US" dirty="0"/>
               <a:t>Mongo DB</a:t>
             </a:r>
           </a:p>
@@ -6478,7 +6481,7 @@
               <a:buChar char="•"/>
             </a:pPr>
             <a:r>
-              <a:rPr lang="en-US" dirty="0" smtClean="0"/>
+              <a:rPr lang="en-US" dirty="0"/>
               <a:t>Infrastructure</a:t>
             </a:r>
           </a:p>
@@ -6488,11 +6491,11 @@
               <a:buChar char="•"/>
             </a:pPr>
             <a:r>
-              <a:rPr lang="en-US" dirty="0" err="1" smtClean="0"/>
+              <a:rPr lang="en-US" dirty="0" err="1"/>
               <a:t>Heroku</a:t>
             </a:r>
             <a:r>
-              <a:rPr lang="en-US" dirty="0" smtClean="0"/>
+              <a:rPr lang="en-US" dirty="0"/>
               <a:t> (web server)</a:t>
             </a:r>
           </a:p>
@@ -6502,14 +6505,13 @@
               <a:buChar char="•"/>
             </a:pPr>
             <a:r>
-              <a:rPr lang="en-US" dirty="0" err="1" smtClean="0"/>
+              <a:rPr lang="en-US" dirty="0" err="1"/>
               <a:t>Mlab</a:t>
             </a:r>
             <a:r>
-              <a:rPr lang="en-US" dirty="0" smtClean="0"/>
+              <a:rPr lang="en-US" dirty="0"/>
               <a:t> (database host)</a:t>
             </a:r>
-            <a:endParaRPr lang="en-US" dirty="0" smtClean="0"/>
           </a:p>
           <a:p>
             <a:pPr marL="285750" indent="-285750">
@@ -6517,10 +6519,9 @@
               <a:buChar char="•"/>
             </a:pPr>
             <a:r>
-              <a:rPr lang="en-US" dirty="0" smtClean="0"/>
+              <a:rPr lang="en-US" dirty="0"/>
               <a:t>Project Management</a:t>
             </a:r>
-            <a:endParaRPr lang="en-US" dirty="0"/>
           </a:p>
           <a:p>
             <a:pPr marL="742950" lvl="1" indent="-285750">
@@ -6528,7 +6529,7 @@
               <a:buChar char="•"/>
             </a:pPr>
             <a:r>
-              <a:rPr lang="en-US" dirty="0" smtClean="0"/>
+              <a:rPr lang="en-US" dirty="0"/>
               <a:t>Slack (chat)</a:t>
             </a:r>
           </a:p>
@@ -6538,7 +6539,7 @@
               <a:buChar char="•"/>
             </a:pPr>
             <a:r>
-              <a:rPr lang="en-US" dirty="0" smtClean="0"/>
+              <a:rPr lang="en-US" dirty="0"/>
               <a:t>Trello (storyboard)</a:t>
             </a:r>
           </a:p>
@@ -6548,10 +6549,10 @@
               <a:buChar char="•"/>
             </a:pPr>
             <a:r>
-              <a:rPr lang="en-US" dirty="0" err="1" smtClean="0"/>
+              <a:rPr lang="en-US" dirty="0" err="1"/>
               <a:t>Github</a:t>
             </a:r>
-            <a:endParaRPr lang="en-US" dirty="0" smtClean="0"/>
+            <a:endParaRPr lang="en-US" dirty="0"/>
           </a:p>
         </p:txBody>
       </p:sp>
@@ -6601,10 +6602,9 @@
           <a:lstStyle/>
           <a:p>
             <a:r>
-              <a:rPr lang="en-US" dirty="0" smtClean="0"/>
+              <a:rPr lang="en-US" dirty="0"/>
               <a:t>Demo</a:t>
             </a:r>
-            <a:endParaRPr lang="en-US" dirty="0"/>
           </a:p>
         </p:txBody>
       </p:sp>
@@ -6624,21 +6624,21 @@
           <a:lstStyle/>
           <a:p>
             <a:r>
-              <a:rPr lang="en-US" dirty="0" smtClean="0">
+              <a:rPr lang="en-US" dirty="0">
                 <a:hlinkClick r:id="rId2"/>
               </a:rPr>
               <a:t>http://eventhawk.herokuapp.com/</a:t>
             </a:r>
-            <a:endParaRPr lang="en-US" dirty="0" smtClean="0"/>
-          </a:p>
-          <a:p>
-            <a:r>
-              <a:rPr lang="en-US" dirty="0" smtClean="0">
+            <a:endParaRPr lang="en-US" dirty="0"/>
+          </a:p>
+          <a:p>
+            <a:r>
+              <a:rPr lang="en-US" dirty="0">
                 <a:hlinkClick r:id="rId3"/>
               </a:rPr>
               <a:t>http://eventhawkapi.herokuapp.com/</a:t>
             </a:r>
-            <a:endParaRPr lang="en-US" dirty="0" smtClean="0"/>
+            <a:endParaRPr lang="en-US" dirty="0"/>
           </a:p>
           <a:p>
             <a:pPr marL="0" indent="0">

</xml_diff>